<commit_message>
AV224 lectures updated till 19th Jan
</commit_message>
<xml_diff>
--- a/2017_AV224/Material/Lecture_5.pptx
+++ b/2017_AV224/Material/Lecture_5.pptx
@@ -3454,7 +3454,7 @@
         <p:spPr>
           <a:xfrm>
             <a:off x="185420" y="905510"/>
-            <a:ext cx="11798300" cy="2578100"/>
+            <a:ext cx="11798300" cy="4498340"/>
           </a:xfrm>
           <a:prstGeom prst="rect">
             <a:avLst/>
@@ -3488,7 +3488,144 @@
               <a:buFont typeface="Arial" charset="0"/>
               <a:buChar char="•"/>
             </a:pPr>
-            <a:endParaRPr lang="x-none" altLang="en-IN"/>
+            <a:r>
+              <a:rPr lang="x-none" altLang="en-IN">
+                <a:solidFill>
+                  <a:srgbClr val="FF0000"/>
+                </a:solidFill>
+              </a:rPr>
+              <a:t>Reading assignment and other tasks</a:t>
+            </a:r>
+            <a:endParaRPr lang="x-none" altLang="en-IN">
+              <a:solidFill>
+                <a:srgbClr val="FF0000"/>
+              </a:solidFill>
+            </a:endParaRPr>
+          </a:p>
+          <a:p>
+            <a:pPr marL="742950" lvl="1" indent="-285750">
+              <a:buFont typeface="Arial" charset="0"/>
+              <a:buChar char="•"/>
+            </a:pPr>
+            <a:r>
+              <a:rPr lang="x-none" altLang="en-IN">
+                <a:solidFill>
+                  <a:srgbClr val="FF0000"/>
+                </a:solidFill>
+              </a:rPr>
+              <a:t>Start reading Chapter 2 of Hennessy and Patterson</a:t>
+            </a:r>
+            <a:endParaRPr lang="x-none" altLang="en-IN">
+              <a:solidFill>
+                <a:srgbClr val="FF0000"/>
+              </a:solidFill>
+            </a:endParaRPr>
+          </a:p>
+          <a:p>
+            <a:pPr marL="1200150" lvl="2" indent="-285750">
+              <a:buFont typeface="Arial" charset="0"/>
+              <a:buChar char="•"/>
+            </a:pPr>
+            <a:r>
+              <a:rPr lang="x-none" altLang="en-IN">
+                <a:solidFill>
+                  <a:srgbClr val="FF0000"/>
+                </a:solidFill>
+              </a:rPr>
+              <a:t>what are the instructions for ARM that have similar results as x86?</a:t>
+            </a:r>
+            <a:endParaRPr lang="x-none" altLang="en-IN">
+              <a:solidFill>
+                <a:srgbClr val="FF0000"/>
+              </a:solidFill>
+            </a:endParaRPr>
+          </a:p>
+          <a:p>
+            <a:pPr marL="1200150" lvl="2" indent="-285750">
+              <a:buFont typeface="Arial" charset="0"/>
+              <a:buChar char="•"/>
+            </a:pPr>
+            <a:r>
+              <a:rPr lang="x-none" altLang="en-IN">
+                <a:solidFill>
+                  <a:srgbClr val="FF0000"/>
+                </a:solidFill>
+              </a:rPr>
+              <a:t>what is the ARM processor model?</a:t>
+            </a:r>
+            <a:endParaRPr lang="x-none" altLang="en-IN">
+              <a:solidFill>
+                <a:srgbClr val="FF0000"/>
+              </a:solidFill>
+            </a:endParaRPr>
+          </a:p>
+          <a:p>
+            <a:pPr marL="1200150" lvl="2" indent="-285750">
+              <a:buFont typeface="Arial" charset="0"/>
+              <a:buChar char="•"/>
+            </a:pPr>
+            <a:r>
+              <a:rPr lang="x-none" altLang="en-IN">
+                <a:solidFill>
+                  <a:srgbClr val="FF0000"/>
+                </a:solidFill>
+              </a:rPr>
+              <a:t>how different are the ARM instructions from x86?</a:t>
+            </a:r>
+            <a:endParaRPr lang="x-none" altLang="en-IN">
+              <a:solidFill>
+                <a:srgbClr val="FF0000"/>
+              </a:solidFill>
+            </a:endParaRPr>
+          </a:p>
+          <a:p>
+            <a:pPr marL="742950" lvl="1" indent="-285750">
+              <a:buFont typeface="Arial" charset="0"/>
+              <a:buChar char="•"/>
+            </a:pPr>
+            <a:r>
+              <a:rPr lang="x-none" altLang="en-IN">
+                <a:solidFill>
+                  <a:srgbClr val="FF0000"/>
+                </a:solidFill>
+              </a:rPr>
+              <a:t>Search on the internet for x86 programming examples; familiarize yourself</a:t>
+            </a:r>
+            <a:endParaRPr lang="x-none" altLang="en-IN">
+              <a:solidFill>
+                <a:srgbClr val="FF0000"/>
+              </a:solidFill>
+            </a:endParaRPr>
+          </a:p>
+          <a:p>
+            <a:pPr marL="742950" lvl="1" indent="-285750">
+              <a:buFont typeface="Arial" charset="0"/>
+              <a:buChar char="•"/>
+            </a:pPr>
+            <a:r>
+              <a:rPr lang="x-none" altLang="en-IN">
+                <a:solidFill>
+                  <a:srgbClr val="FF0000"/>
+                </a:solidFill>
+              </a:rPr>
+              <a:t>Search on the internet for x86 simulators; find out how to use them</a:t>
+            </a:r>
+            <a:endParaRPr lang="x-none" altLang="en-IN">
+              <a:solidFill>
+                <a:srgbClr val="FF0000"/>
+              </a:solidFill>
+            </a:endParaRPr>
+          </a:p>
+          <a:p>
+            <a:pPr marL="285750" lvl="0" indent="-285750">
+              <a:buFont typeface="Arial" charset="0"/>
+              <a:buChar char="•"/>
+            </a:pPr>
+            <a:endParaRPr lang="x-none" altLang="en-IN">
+              <a:solidFill>
+                <a:srgbClr val="FF0000"/>
+              </a:solidFill>
+            </a:endParaRPr>
           </a:p>
           <a:p>
             <a:pPr marL="285750" lvl="0" indent="-285750">
@@ -4450,7 +4587,7 @@
             </a:pPr>
             <a:r>
               <a:rPr lang="x-none" altLang="en-IN"/>
-              <a:t>What does EBP do?</a:t>
+              <a:t>What about EBP?</a:t>
             </a:r>
             <a:endParaRPr lang="x-none" altLang="en-IN"/>
           </a:p>
@@ -4480,6 +4617,84 @@
           </a:prstGeom>
         </p:spPr>
       </p:pic>
+      <p:sp>
+        <p:nvSpPr>
+          <p:cNvPr id="8" name="Rectangle 7"/>
+          <p:cNvSpPr/>
+          <p:nvPr/>
+        </p:nvSpPr>
+        <p:spPr>
+          <a:xfrm>
+            <a:off x="6361430" y="4018915"/>
+            <a:ext cx="1183640" cy="2148840"/>
+          </a:xfrm>
+          <a:prstGeom prst="rect">
+            <a:avLst/>
+          </a:prstGeom>
+          <a:noFill/>
+          <a:ln w="34925"/>
+        </p:spPr>
+        <p:style>
+          <a:lnRef idx="2">
+            <a:schemeClr val="dk1"/>
+          </a:lnRef>
+          <a:fillRef idx="1">
+            <a:schemeClr val="lt1"/>
+          </a:fillRef>
+          <a:effectRef idx="0">
+            <a:schemeClr val="dk1"/>
+          </a:effectRef>
+          <a:fontRef idx="minor">
+            <a:schemeClr val="dk1"/>
+          </a:fontRef>
+        </p:style>
+        <p:txBody>
+          <a:bodyPr rtlCol="0" anchor="ctr"/>
+          <a:p>
+            <a:pPr algn="ctr"/>
+            <a:endParaRPr lang="en-IN" altLang="en-US"/>
+          </a:p>
+        </p:txBody>
+      </p:sp>
+      <p:sp>
+        <p:nvSpPr>
+          <p:cNvPr id="9" name="Rectangle 8"/>
+          <p:cNvSpPr/>
+          <p:nvPr/>
+        </p:nvSpPr>
+        <p:spPr>
+          <a:xfrm>
+            <a:off x="7530465" y="4017010"/>
+            <a:ext cx="1183640" cy="2148840"/>
+          </a:xfrm>
+          <a:prstGeom prst="rect">
+            <a:avLst/>
+          </a:prstGeom>
+          <a:noFill/>
+          <a:ln w="34925"/>
+        </p:spPr>
+        <p:style>
+          <a:lnRef idx="2">
+            <a:schemeClr val="dk1"/>
+          </a:lnRef>
+          <a:fillRef idx="1">
+            <a:schemeClr val="lt1"/>
+          </a:fillRef>
+          <a:effectRef idx="0">
+            <a:schemeClr val="dk1"/>
+          </a:effectRef>
+          <a:fontRef idx="minor">
+            <a:schemeClr val="dk1"/>
+          </a:fontRef>
+        </p:style>
+        <p:txBody>
+          <a:bodyPr rtlCol="0" anchor="ctr"/>
+          <a:p>
+            <a:pPr algn="ctr"/>
+            <a:endParaRPr lang="en-IN" altLang="en-US"/>
+          </a:p>
+        </p:txBody>
+      </p:sp>
     </p:spTree>
   </p:cSld>
   <p:clrMapOvr>

</xml_diff>